<commit_message>
related work slide, minor fixes
</commit_message>
<xml_diff>
--- a/malwareSlides.pptx
+++ b/malwareSlides.pptx
@@ -124,7 +124,7 @@
   </p:defaultTextStyle>
   <p:extLst>
     <p:ext uri="{EFAFB233-063F-42B5-8137-9DF3F51BA10A}">
-      <p15:sldGuideLst xmlns:p15="http://schemas.microsoft.com/office/powerpoint/2012/main" xmlns="">
+      <p15:sldGuideLst xmlns:p15="http://schemas.microsoft.com/office/powerpoint/2012/main">
         <p15:guide id="1" orient="horz" pos="2160">
           <p15:clr>
             <a:srgbClr val="A4A3A4"/>
@@ -184,31 +184,31 @@
                 <c:formatCode>General</c:formatCode>
                 <c:ptCount val="9"/>
                 <c:pt idx="0">
-                  <c:v>1.0</c:v>
+                  <c:v>1</c:v>
                 </c:pt>
                 <c:pt idx="1">
-                  <c:v>2.0</c:v>
+                  <c:v>2</c:v>
                 </c:pt>
                 <c:pt idx="2">
-                  <c:v>3.0</c:v>
+                  <c:v>3</c:v>
                 </c:pt>
                 <c:pt idx="3">
-                  <c:v>4.0</c:v>
+                  <c:v>4</c:v>
                 </c:pt>
                 <c:pt idx="4">
-                  <c:v>5.0</c:v>
+                  <c:v>5</c:v>
                 </c:pt>
                 <c:pt idx="5">
-                  <c:v>6.0</c:v>
+                  <c:v>6</c:v>
                 </c:pt>
                 <c:pt idx="6">
-                  <c:v>7.0</c:v>
+                  <c:v>7</c:v>
                 </c:pt>
                 <c:pt idx="7">
-                  <c:v>8.0</c:v>
+                  <c:v>8</c:v>
                 </c:pt>
                 <c:pt idx="8">
-                  <c:v>9.0</c:v>
+                  <c:v>9</c:v>
                 </c:pt>
               </c:numCache>
             </c:numRef>
@@ -257,31 +257,31 @@
                 <c:formatCode>General</c:formatCode>
                 <c:ptCount val="9"/>
                 <c:pt idx="0">
-                  <c:v>1.0</c:v>
+                  <c:v>1</c:v>
                 </c:pt>
                 <c:pt idx="1">
-                  <c:v>2.0</c:v>
+                  <c:v>2</c:v>
                 </c:pt>
                 <c:pt idx="2">
-                  <c:v>3.0</c:v>
+                  <c:v>3</c:v>
                 </c:pt>
                 <c:pt idx="3">
-                  <c:v>4.0</c:v>
+                  <c:v>4</c:v>
                 </c:pt>
                 <c:pt idx="4">
-                  <c:v>5.0</c:v>
+                  <c:v>5</c:v>
                 </c:pt>
                 <c:pt idx="5">
-                  <c:v>6.0</c:v>
+                  <c:v>6</c:v>
                 </c:pt>
                 <c:pt idx="6">
-                  <c:v>7.0</c:v>
+                  <c:v>7</c:v>
                 </c:pt>
                 <c:pt idx="7">
-                  <c:v>8.0</c:v>
+                  <c:v>8</c:v>
                 </c:pt>
                 <c:pt idx="8">
-                  <c:v>9.0</c:v>
+                  <c:v>9</c:v>
                 </c:pt>
               </c:numCache>
             </c:numRef>
@@ -296,7 +296,7 @@
                   <c:v>2.4</c:v>
                 </c:pt>
                 <c:pt idx="1">
-                  <c:v>4.4</c:v>
+                  <c:v>4.4000000000000004</c:v>
                 </c:pt>
                 <c:pt idx="2">
                   <c:v>1.8</c:v>
@@ -330,31 +330,31 @@
                 <c:formatCode>General</c:formatCode>
                 <c:ptCount val="9"/>
                 <c:pt idx="0">
-                  <c:v>1.0</c:v>
+                  <c:v>1</c:v>
                 </c:pt>
                 <c:pt idx="1">
-                  <c:v>2.0</c:v>
+                  <c:v>2</c:v>
                 </c:pt>
                 <c:pt idx="2">
-                  <c:v>3.0</c:v>
+                  <c:v>3</c:v>
                 </c:pt>
                 <c:pt idx="3">
-                  <c:v>4.0</c:v>
+                  <c:v>4</c:v>
                 </c:pt>
                 <c:pt idx="4">
-                  <c:v>5.0</c:v>
+                  <c:v>5</c:v>
                 </c:pt>
                 <c:pt idx="5">
-                  <c:v>6.0</c:v>
+                  <c:v>6</c:v>
                 </c:pt>
                 <c:pt idx="6">
-                  <c:v>7.0</c:v>
+                  <c:v>7</c:v>
                 </c:pt>
                 <c:pt idx="7">
-                  <c:v>8.0</c:v>
+                  <c:v>8</c:v>
                 </c:pt>
                 <c:pt idx="8">
-                  <c:v>9.0</c:v>
+                  <c:v>9</c:v>
                 </c:pt>
               </c:numCache>
             </c:numRef>
@@ -366,16 +366,16 @@
                 <c:formatCode>General</c:formatCode>
                 <c:ptCount val="9"/>
                 <c:pt idx="0">
-                  <c:v>2.0</c:v>
+                  <c:v>2</c:v>
                 </c:pt>
                 <c:pt idx="1">
-                  <c:v>2.0</c:v>
+                  <c:v>2</c:v>
                 </c:pt>
                 <c:pt idx="2">
-                  <c:v>3.0</c:v>
+                  <c:v>3</c:v>
                 </c:pt>
                 <c:pt idx="3">
-                  <c:v>5.0</c:v>
+                  <c:v>5</c:v>
                 </c:pt>
               </c:numCache>
             </c:numRef>
@@ -390,11 +390,11 @@
           <c:showBubbleSize val="0"/>
         </c:dLbls>
         <c:gapWidth val="150"/>
-        <c:axId val="-2135935832"/>
-        <c:axId val="-2131277720"/>
+        <c:axId val="258599392"/>
+        <c:axId val="258601744"/>
       </c:barChart>
       <c:catAx>
-        <c:axId val="-2135935832"/>
+        <c:axId val="258599392"/>
         <c:scaling>
           <c:orientation val="minMax"/>
         </c:scaling>
@@ -404,7 +404,7 @@
         <c:majorTickMark val="out"/>
         <c:minorTickMark val="none"/>
         <c:tickLblPos val="nextTo"/>
-        <c:crossAx val="-2131277720"/>
+        <c:crossAx val="258601744"/>
         <c:crosses val="autoZero"/>
         <c:auto val="1"/>
         <c:lblAlgn val="ctr"/>
@@ -412,7 +412,7 @@
         <c:noMultiLvlLbl val="0"/>
       </c:catAx>
       <c:valAx>
-        <c:axId val="-2131277720"/>
+        <c:axId val="258601744"/>
         <c:scaling>
           <c:orientation val="minMax"/>
         </c:scaling>
@@ -423,7 +423,7 @@
         <c:majorTickMark val="out"/>
         <c:minorTickMark val="none"/>
         <c:tickLblPos val="nextTo"/>
-        <c:crossAx val="-2135935832"/>
+        <c:crossAx val="258599392"/>
         <c:crosses val="autoZero"/>
         <c:crossBetween val="between"/>
       </c:valAx>
@@ -534,7 +534,7 @@
           </a:lstStyle>
           <a:p>
             <a:fld id="{39CE09AA-AD7C-FB46-BD3E-8A7CAFD3B56A}" type="datetimeFigureOut">
-              <a:t>4/19/15</a:t>
+              <a:t>4/19/2015</a:t>
             </a:fld>
             <a:endParaRPr lang="en-US"/>
           </a:p>
@@ -1300,7 +1300,7 @@
           <a:p>
             <a:fld id="{6BFECD78-3C8E-49F2-8FAB-59489D168ABB}" type="datetimeFigureOut">
               <a:rPr lang="en-US" smtClean="0"/>
-              <a:t>4/19/15</a:t>
+              <a:t>4/19/2015</a:t>
             </a:fld>
             <a:endParaRPr lang="en-US"/>
           </a:p>
@@ -1500,7 +1500,7 @@
           <a:p>
             <a:fld id="{6BFECD78-3C8E-49F2-8FAB-59489D168ABB}" type="datetimeFigureOut">
               <a:rPr lang="en-US" smtClean="0"/>
-              <a:t>4/19/15</a:t>
+              <a:t>4/19/2015</a:t>
             </a:fld>
             <a:endParaRPr lang="en-US"/>
           </a:p>
@@ -1675,7 +1675,7 @@
           <a:p>
             <a:fld id="{6BFECD78-3C8E-49F2-8FAB-59489D168ABB}" type="datetimeFigureOut">
               <a:rPr lang="en-US" smtClean="0"/>
-              <a:t>4/19/15</a:t>
+              <a:t>4/19/2015</a:t>
             </a:fld>
             <a:endParaRPr lang="en-US"/>
           </a:p>
@@ -1840,7 +1840,7 @@
           <a:p>
             <a:fld id="{6BFECD78-3C8E-49F2-8FAB-59489D168ABB}" type="datetimeFigureOut">
               <a:rPr lang="en-US" smtClean="0"/>
-              <a:t>4/19/15</a:t>
+              <a:t>4/19/2015</a:t>
             </a:fld>
             <a:endParaRPr lang="en-US"/>
           </a:p>
@@ -2088,7 +2088,7 @@
           <a:p>
             <a:fld id="{6BFECD78-3C8E-49F2-8FAB-59489D168ABB}" type="datetimeFigureOut">
               <a:rPr lang="en-US" smtClean="0"/>
-              <a:t>4/19/15</a:t>
+              <a:t>4/19/2015</a:t>
             </a:fld>
             <a:endParaRPr lang="en-US"/>
           </a:p>
@@ -2406,7 +2406,7 @@
           <a:p>
             <a:fld id="{6BFECD78-3C8E-49F2-8FAB-59489D168ABB}" type="datetimeFigureOut">
               <a:rPr lang="en-US" smtClean="0"/>
-              <a:t>4/19/15</a:t>
+              <a:t>4/19/2015</a:t>
             </a:fld>
             <a:endParaRPr lang="en-US"/>
           </a:p>
@@ -2872,7 +2872,7 @@
           <a:p>
             <a:fld id="{6BFECD78-3C8E-49F2-8FAB-59489D168ABB}" type="datetimeFigureOut">
               <a:rPr lang="en-US" smtClean="0"/>
-              <a:t>4/19/15</a:t>
+              <a:t>4/19/2015</a:t>
             </a:fld>
             <a:endParaRPr lang="en-US"/>
           </a:p>
@@ -3020,7 +3020,7 @@
           <a:p>
             <a:fld id="{6BFECD78-3C8E-49F2-8FAB-59489D168ABB}" type="datetimeFigureOut">
               <a:rPr lang="en-US" smtClean="0"/>
-              <a:t>4/19/15</a:t>
+              <a:t>4/19/2015</a:t>
             </a:fld>
             <a:endParaRPr lang="en-US"/>
           </a:p>
@@ -3110,7 +3110,7 @@
           <a:p>
             <a:fld id="{6BFECD78-3C8E-49F2-8FAB-59489D168ABB}" type="datetimeFigureOut">
               <a:rPr lang="en-US" smtClean="0"/>
-              <a:t>4/19/15</a:t>
+              <a:t>4/19/2015</a:t>
             </a:fld>
             <a:endParaRPr lang="en-US"/>
           </a:p>
@@ -3384,7 +3384,7 @@
           <a:p>
             <a:fld id="{6BFECD78-3C8E-49F2-8FAB-59489D168ABB}" type="datetimeFigureOut">
               <a:rPr lang="en-US" smtClean="0"/>
-              <a:t>4/19/15</a:t>
+              <a:t>4/19/2015</a:t>
             </a:fld>
             <a:endParaRPr lang="en-US"/>
           </a:p>
@@ -3689,7 +3689,7 @@
           <a:p>
             <a:fld id="{6BFECD78-3C8E-49F2-8FAB-59489D168ABB}" type="datetimeFigureOut">
               <a:rPr lang="en-US" smtClean="0"/>
-              <a:t>4/19/15</a:t>
+              <a:t>4/19/2015</a:t>
             </a:fld>
             <a:endParaRPr lang="en-US"/>
           </a:p>
@@ -3987,7 +3987,7 @@
           <a:p>
             <a:fld id="{6BFECD78-3C8E-49F2-8FAB-59489D168ABB}" type="datetimeFigureOut">
               <a:rPr lang="en-US" smtClean="0"/>
-              <a:t>4/19/15</a:t>
+              <a:t>4/19/2015</a:t>
             </a:fld>
             <a:endParaRPr lang="en-US"/>
           </a:p>
@@ -5414,7 +5414,7 @@
         </p:nvGraphicFramePr>
         <p:xfrm>
           <a:off x="589894" y="1865609"/>
-          <a:ext cx="7517098" cy="3667760"/>
+          <a:ext cx="7517098" cy="4490720"/>
         </p:xfrm>
         <a:graphic>
           <a:graphicData uri="http://schemas.openxmlformats.org/drawingml/2006/table">
@@ -5438,7 +5438,7 @@
                     <a:p>
                       <a:pPr algn="ctr"/>
                       <a:r>
-                        <a:rPr lang="en-US" b="0"/>
+                        <a:rPr lang="en-US" b="0" dirty="0"/>
                         <a:t>Classifier</a:t>
                       </a:r>
                     </a:p>
@@ -5787,14 +5787,14 @@
                     <a:p>
                       <a:pPr algn="ctr"/>
                       <a:r>
-                        <a:rPr lang="en-US"/>
+                        <a:rPr lang="en-US" dirty="0"/>
                         <a:t>Naïve</a:t>
                       </a:r>
                       <a:r>
-                        <a:rPr lang="en-US" baseline="0"/>
+                        <a:rPr lang="en-US" baseline="0" dirty="0"/>
                         <a:t> Bayes</a:t>
                       </a:r>
-                      <a:endParaRPr lang="en-US"/>
+                      <a:endParaRPr lang="en-US" dirty="0"/>
                     </a:p>
                   </a:txBody>
                   <a:tcPr anchor="ctr" anchorCtr="1">
@@ -7819,7 +7819,7 @@
         <p:spPr>
           <a:xfrm>
             <a:off x="457200" y="1524000"/>
-            <a:ext cx="8328991" cy="646331"/>
+            <a:ext cx="8328991" cy="584775"/>
           </a:xfrm>
           <a:prstGeom prst="rect">
             <a:avLst/>
@@ -7832,60 +7832,47 @@
           <a:lstStyle/>
           <a:p>
             <a:r>
-              <a:rPr lang="en-US" dirty="0" smtClean="0">
-                <a:latin typeface="NimbusRomNo9L-Regu"/>
-              </a:rPr>
-              <a:t>[1] Mehmet </a:t>
-            </a:r>
-            <a:r>
-              <a:rPr lang="en-US" dirty="0" err="1" smtClean="0">
-                <a:latin typeface="NimbusRomNo9L-Regu"/>
-              </a:rPr>
+              <a:rPr lang="en-US" sz="1600" dirty="0"/>
+              <a:t>[1] Abdurrahman </a:t>
+            </a:r>
+            <a:r>
+              <a:rPr lang="en-US" sz="1600" dirty="0" err="1"/>
+              <a:t>Pekta</a:t>
+            </a:r>
+            <a:r>
+              <a:rPr lang="en-US" sz="1600" dirty="0"/>
+              <a:t>, Mehmet </a:t>
+            </a:r>
+            <a:r>
+              <a:rPr lang="en-US" sz="1600" dirty="0" err="1"/>
               <a:t>Eri</a:t>
             </a:r>
             <a:r>
-              <a:rPr lang="en-US" dirty="0" smtClean="0">
-                <a:latin typeface="NimbusRomNo9L-Regu"/>
-              </a:rPr>
-              <a:t> Abdurrahman </a:t>
-            </a:r>
-            <a:r>
-              <a:rPr lang="en-US" dirty="0" err="1" smtClean="0">
-                <a:latin typeface="NimbusRomNo9L-Regu"/>
-              </a:rPr>
-              <a:t>Pekta</a:t>
-            </a:r>
-            <a:r>
-              <a:rPr lang="en-US" dirty="0" smtClean="0">
-                <a:latin typeface="NimbusRomNo9L-Regu"/>
-              </a:rPr>
-              <a:t> and </a:t>
-            </a:r>
-            <a:r>
-              <a:rPr lang="en-US" dirty="0" err="1" smtClean="0">
-                <a:latin typeface="NimbusRomNo9L-Regu"/>
-              </a:rPr>
+              <a:rPr lang="en-US" sz="1600" dirty="0"/>
+              <a:t>, and </a:t>
+            </a:r>
+            <a:r>
+              <a:rPr lang="en-US" sz="1600" dirty="0" err="1"/>
               <a:t>Tankut</a:t>
             </a:r>
             <a:r>
-              <a:rPr lang="en-US" dirty="0" smtClean="0">
-                <a:latin typeface="NimbusRomNo9L-Regu"/>
-              </a:rPr>
+              <a:rPr lang="en-US" sz="1600" dirty="0"/>
               <a:t> </a:t>
             </a:r>
             <a:r>
-              <a:rPr lang="en-US" dirty="0" err="1" smtClean="0">
-                <a:latin typeface="NimbusRomNo9L-Regu"/>
-              </a:rPr>
+              <a:rPr lang="en-US" sz="1600" dirty="0" err="1"/>
               <a:t>Acarman</a:t>
             </a:r>
             <a:r>
-              <a:rPr lang="en-US" dirty="0" smtClean="0">
-                <a:latin typeface="NimbusRomNo9L-Regu"/>
-              </a:rPr>
-              <a:t>. 2011. Proposal of n-gram Based Algorithm for Malware Classification. (2011).</a:t>
-            </a:r>
-            <a:endParaRPr lang="en-US" dirty="0"/>
+              <a:rPr lang="en-US" sz="1600" dirty="0"/>
+              <a:t>. 2011. Proposal of</a:t>
+            </a:r>
+          </a:p>
+          <a:p>
+            <a:r>
+              <a:rPr lang="en-US" sz="1600" dirty="0"/>
+              <a:t>n-gram Based Algorithm for Malware Classification. (2011).</a:t>
+            </a:r>
           </a:p>
         </p:txBody>
       </p:sp>
@@ -7898,7 +7885,7 @@
         <p:spPr>
           <a:xfrm>
             <a:off x="457201" y="2238610"/>
-            <a:ext cx="8328990" cy="646331"/>
+            <a:ext cx="8328990" cy="584775"/>
           </a:xfrm>
           <a:prstGeom prst="rect">
             <a:avLst/>
@@ -7911,42 +7898,33 @@
           <a:lstStyle/>
           <a:p>
             <a:r>
-              <a:rPr lang="en-US" dirty="0" smtClean="0">
-                <a:latin typeface="NimbusRomNo9L-Regu"/>
-              </a:rPr>
-              <a:t>[2] J</a:t>
-            </a:r>
-            <a:r>
-              <a:rPr lang="en-US" dirty="0">
-                <a:latin typeface="NimbusRomNo9L-Regu"/>
-              </a:rPr>
+              <a:rPr lang="en-US" sz="1600" dirty="0"/>
+              <a:t>[2] </a:t>
+            </a:r>
+            <a:r>
+              <a:rPr lang="en-US" sz="1600" dirty="0" smtClean="0"/>
+              <a:t>J</a:t>
+            </a:r>
+            <a:r>
+              <a:rPr lang="en-US" sz="1600" dirty="0"/>
               <a:t>. Zico </a:t>
             </a:r>
             <a:r>
-              <a:rPr lang="en-US" dirty="0" err="1">
-                <a:latin typeface="NimbusRomNo9L-Regu"/>
-              </a:rPr>
+              <a:rPr lang="en-US" sz="1600" dirty="0" err="1"/>
               <a:t>Kolter</a:t>
             </a:r>
             <a:r>
-              <a:rPr lang="en-US" dirty="0">
-                <a:latin typeface="NimbusRomNo9L-Regu"/>
-              </a:rPr>
-              <a:t> and Marcus A. Maloof. 2006. Learning to Detect and </a:t>
-            </a:r>
-            <a:r>
-              <a:rPr lang="en-US" dirty="0" smtClean="0">
-                <a:latin typeface="NimbusRomNo9L-Regu"/>
-              </a:rPr>
-              <a:t>Classify Malicious </a:t>
-            </a:r>
-            <a:r>
-              <a:rPr lang="en-US" dirty="0">
-                <a:latin typeface="NimbusRomNo9L-Regu"/>
-              </a:rPr>
+              <a:rPr lang="en-US" sz="1600" dirty="0"/>
+              <a:t> and Marcus A. Maloof. 2006. Learning to Detect </a:t>
+            </a:r>
+            <a:r>
+              <a:rPr lang="en-US" sz="1600" dirty="0" smtClean="0"/>
+              <a:t>and Classify Malicious </a:t>
+            </a:r>
+            <a:r>
+              <a:rPr lang="en-US" sz="1600" dirty="0"/>
               <a:t>Executables in the Wild. 7, Article 19 (2006), 2721–2744.</a:t>
             </a:r>
-            <a:endParaRPr lang="en-US" dirty="0"/>
           </a:p>
         </p:txBody>
       </p:sp>
@@ -7959,7 +7937,7 @@
         <p:spPr>
           <a:xfrm>
             <a:off x="457201" y="2953220"/>
-            <a:ext cx="8328990" cy="646331"/>
+            <a:ext cx="8328990" cy="584775"/>
           </a:xfrm>
           <a:prstGeom prst="rect">
             <a:avLst/>
@@ -7972,98 +7950,69 @@
           <a:lstStyle/>
           <a:p>
             <a:r>
-              <a:rPr lang="en-US" dirty="0" smtClean="0">
-                <a:latin typeface="NimbusRomNo9L-Regu"/>
-              </a:rPr>
+              <a:rPr lang="en-US" sz="1600" dirty="0"/>
               <a:t>[3] </a:t>
             </a:r>
             <a:r>
-              <a:rPr lang="en-US" dirty="0" err="1" smtClean="0">
-                <a:latin typeface="NimbusRomNo9L-Regu"/>
-              </a:rPr>
+              <a:rPr lang="en-US" sz="1600" dirty="0" smtClean="0"/>
+              <a:t>Mihai </a:t>
+            </a:r>
+            <a:r>
+              <a:rPr lang="en-US" sz="1600" dirty="0" err="1"/>
+              <a:t>Christodorescu</a:t>
+            </a:r>
+            <a:r>
+              <a:rPr lang="en-US" sz="1600" dirty="0"/>
+              <a:t>, </a:t>
+            </a:r>
+            <a:r>
+              <a:rPr lang="en-US" sz="1600" dirty="0" err="1"/>
+              <a:t>Somesh</a:t>
+            </a:r>
+            <a:r>
+              <a:rPr lang="en-US" sz="1600" dirty="0"/>
+              <a:t> </a:t>
+            </a:r>
+            <a:r>
+              <a:rPr lang="en-US" sz="1600" dirty="0" err="1"/>
+              <a:t>Jha</a:t>
+            </a:r>
+            <a:r>
+              <a:rPr lang="en-US" sz="1600" dirty="0"/>
+              <a:t>, </a:t>
+            </a:r>
+            <a:r>
+              <a:rPr lang="en-US" sz="1600" dirty="0" err="1"/>
               <a:t>Sanjit</a:t>
             </a:r>
             <a:r>
-              <a:rPr lang="en-US" dirty="0" smtClean="0">
-                <a:latin typeface="NimbusRomNo9L-Regu"/>
-              </a:rPr>
-              <a:t> </a:t>
-            </a:r>
-            <a:r>
-              <a:rPr lang="en-US" dirty="0">
-                <a:latin typeface="NimbusRomNo9L-Regu"/>
-              </a:rPr>
-              <a:t>A. </a:t>
-            </a:r>
-            <a:r>
-              <a:rPr lang="en-US" dirty="0" err="1">
-                <a:latin typeface="NimbusRomNo9L-Regu"/>
-              </a:rPr>
+              <a:rPr lang="en-US" sz="1600" dirty="0"/>
+              <a:t> A. </a:t>
+            </a:r>
+            <a:r>
+              <a:rPr lang="en-US" sz="1600" dirty="0" err="1"/>
               <a:t>Seshia</a:t>
             </a:r>
             <a:r>
-              <a:rPr lang="en-US" dirty="0">
-                <a:latin typeface="NimbusRomNo9L-Regu"/>
-              </a:rPr>
-              <a:t> Dawn Song Mihai </a:t>
-            </a:r>
-            <a:r>
-              <a:rPr lang="en-US" dirty="0" err="1">
-                <a:latin typeface="NimbusRomNo9L-Regu"/>
-              </a:rPr>
-              <a:t>Christodorescu</a:t>
-            </a:r>
-            <a:r>
-              <a:rPr lang="en-US" dirty="0">
-                <a:latin typeface="NimbusRomNo9L-Regu"/>
-              </a:rPr>
-              <a:t>, </a:t>
-            </a:r>
-            <a:r>
-              <a:rPr lang="en-US" dirty="0" err="1">
-                <a:latin typeface="NimbusRomNo9L-Regu"/>
-              </a:rPr>
-              <a:t>Somesh</a:t>
-            </a:r>
-            <a:r>
-              <a:rPr lang="en-US" dirty="0">
-                <a:latin typeface="NimbusRomNo9L-Regu"/>
-              </a:rPr>
-              <a:t> </a:t>
-            </a:r>
-            <a:r>
-              <a:rPr lang="en-US" dirty="0" err="1">
-                <a:latin typeface="NimbusRomNo9L-Regu"/>
-              </a:rPr>
-              <a:t>Jha</a:t>
-            </a:r>
-            <a:r>
-              <a:rPr lang="en-US" dirty="0">
-                <a:latin typeface="NimbusRomNo9L-Regu"/>
-              </a:rPr>
-              <a:t> and Randal</a:t>
-            </a:r>
-          </a:p>
-          <a:p>
-            <a:r>
-              <a:rPr lang="en-US" dirty="0">
-                <a:latin typeface="NimbusRomNo9L-Regu"/>
-              </a:rPr>
-              <a:t>E. Bryant. 2005. Semantics-Aware Malware Detection. (2005), </a:t>
-            </a:r>
-            <a:r>
-              <a:rPr lang="en-US" dirty="0" smtClean="0">
-                <a:latin typeface="NimbusRomNo9L-Regu"/>
-              </a:rPr>
-              <a:t>32–46</a:t>
-            </a:r>
-            <a:r>
-              <a:rPr lang="en-US" dirty="0">
-                <a:latin typeface="NimbusRomNo9L-Regu"/>
-              </a:rPr>
+              <a:rPr lang="en-US" sz="1600" dirty="0"/>
+              <a:t>, Dawn Song, and </a:t>
+            </a:r>
+            <a:r>
+              <a:rPr lang="en-US" sz="1600" dirty="0" smtClean="0"/>
+              <a:t>Randal E</a:t>
+            </a:r>
+            <a:r>
+              <a:rPr lang="en-US" sz="1600" dirty="0"/>
+              <a:t>. Bryant. 2005. Semantics-Aware Malware Detection. (2005), </a:t>
+            </a:r>
+            <a:r>
+              <a:rPr lang="en-US" sz="1600" dirty="0" smtClean="0"/>
+              <a:t>32– 46</a:t>
+            </a:r>
+            <a:r>
+              <a:rPr lang="en-US" sz="1600" dirty="0"/>
               <a:t>.</a:t>
             </a:r>
-            <a:endParaRPr lang="en-US" dirty="0"/>
           </a:p>
         </p:txBody>
       </p:sp>
@@ -8076,7 +8025,7 @@
         <p:spPr>
           <a:xfrm>
             <a:off x="457201" y="3667830"/>
-            <a:ext cx="8229600" cy="646331"/>
+            <a:ext cx="8229600" cy="584775"/>
           </a:xfrm>
           <a:prstGeom prst="rect">
             <a:avLst/>
@@ -8089,42 +8038,25 @@
           <a:lstStyle/>
           <a:p>
             <a:r>
-              <a:rPr lang="en-US" dirty="0" smtClean="0">
-                <a:latin typeface="NimbusRomNo9L-Regu"/>
-              </a:rPr>
-              <a:t>[4] Y</a:t>
-            </a:r>
-            <a:r>
-              <a:rPr lang="en-US" dirty="0">
-                <a:latin typeface="NimbusRomNo9L-Regu"/>
-              </a:rPr>
-              <a:t>. Li N. </a:t>
-            </a:r>
-            <a:r>
-              <a:rPr lang="en-US" dirty="0" err="1">
-                <a:latin typeface="NimbusRomNo9L-Regu"/>
-              </a:rPr>
+              <a:rPr lang="en-US" sz="1600" dirty="0"/>
+              <a:t>[4] N. </a:t>
+            </a:r>
+            <a:r>
+              <a:rPr lang="en-US" sz="1600" dirty="0" err="1"/>
               <a:t>Zhong</a:t>
             </a:r>
             <a:r>
-              <a:rPr lang="en-US" dirty="0">
-                <a:latin typeface="NimbusRomNo9L-Regu"/>
-              </a:rPr>
-              <a:t> and S. T. Wu. 2012. Effective Pattern Discovery for </a:t>
-            </a:r>
-            <a:r>
-              <a:rPr lang="en-US" dirty="0" smtClean="0">
-                <a:latin typeface="NimbusRomNo9L-Regu"/>
-              </a:rPr>
+              <a:rPr lang="en-US" sz="1600" dirty="0"/>
+              <a:t>, Y. Li, and S. T. Wu. 2012. Effective Pattern Discovery for </a:t>
+            </a:r>
+            <a:r>
+              <a:rPr lang="en-US" sz="1600" dirty="0" smtClean="0"/>
               <a:t>Text Mining</a:t>
             </a:r>
             <a:r>
-              <a:rPr lang="en-US" dirty="0">
-                <a:latin typeface="NimbusRomNo9L-Regu"/>
-              </a:rPr>
+              <a:rPr lang="en-US" sz="1600" dirty="0"/>
               <a:t>. 24, Issue 1 (2012), 30–44.</a:t>
             </a:r>
-            <a:endParaRPr lang="en-US" dirty="0"/>
           </a:p>
         </p:txBody>
       </p:sp>
@@ -8137,7 +8069,7 @@
         <p:spPr>
           <a:xfrm>
             <a:off x="457201" y="4382440"/>
-            <a:ext cx="8229600" cy="646331"/>
+            <a:ext cx="8229600" cy="584775"/>
           </a:xfrm>
           <a:prstGeom prst="rect">
             <a:avLst/>
@@ -8150,60 +8082,33 @@
           <a:lstStyle/>
           <a:p>
             <a:r>
-              <a:rPr lang="en-US" dirty="0" smtClean="0">
-                <a:latin typeface="NimbusRomNo9L-Regu"/>
-              </a:rPr>
+              <a:rPr lang="en-US" sz="1600" dirty="0"/>
               <a:t>[5] Ohm </a:t>
             </a:r>
             <a:r>
-              <a:rPr lang="en-US" dirty="0" err="1">
-                <a:latin typeface="NimbusRomNo9L-Regu"/>
-              </a:rPr>
+              <a:rPr lang="en-US" sz="1600" dirty="0" err="1"/>
               <a:t>Sornil</a:t>
             </a:r>
             <a:r>
-              <a:rPr lang="en-US" dirty="0">
-                <a:latin typeface="NimbusRomNo9L-Regu"/>
-              </a:rPr>
+              <a:rPr lang="en-US" sz="1600" dirty="0"/>
               <a:t> and </a:t>
             </a:r>
             <a:r>
-              <a:rPr lang="en-US" dirty="0" err="1">
-                <a:latin typeface="NimbusRomNo9L-Regu"/>
-              </a:rPr>
+              <a:rPr lang="en-US" sz="1600" dirty="0" err="1"/>
               <a:t>Chatchai</a:t>
             </a:r>
             <a:r>
-              <a:rPr lang="en-US" dirty="0">
-                <a:latin typeface="NimbusRomNo9L-Regu"/>
-              </a:rPr>
+              <a:rPr lang="en-US" sz="1600" dirty="0"/>
               <a:t> </a:t>
             </a:r>
             <a:r>
-              <a:rPr lang="en-US" dirty="0" err="1">
-                <a:latin typeface="NimbusRomNo9L-Regu"/>
-              </a:rPr>
+              <a:rPr lang="en-US" sz="1600" dirty="0" err="1"/>
               <a:t>Liangboonprakong</a:t>
             </a:r>
             <a:r>
-              <a:rPr lang="en-US" dirty="0">
-                <a:latin typeface="NimbusRomNo9L-Regu"/>
-              </a:rPr>
-              <a:t>. 2013. Malware </a:t>
-            </a:r>
-            <a:r>
-              <a:rPr lang="en-US" dirty="0" smtClean="0">
-                <a:latin typeface="NimbusRomNo9L-Regu"/>
-              </a:rPr>
-              <a:t>Classification Using </a:t>
-            </a:r>
-            <a:r>
-              <a:rPr lang="en-US" dirty="0">
-                <a:latin typeface="NimbusRomNo9L-Regu"/>
-              </a:rPr>
-              <a:t>N-grams Sequential Pattern Features. (2013).</a:t>
-            </a:r>
-            <a:endParaRPr lang="en-US" dirty="0"/>
+              <a:rPr lang="en-US" sz="1600" dirty="0"/>
+              <a:t>. 2013. Malware Classification Using N-grams Sequential Pattern Features. (2013).</a:t>
+            </a:r>
           </a:p>
         </p:txBody>
       </p:sp>
@@ -8216,7 +8121,7 @@
         <p:spPr>
           <a:xfrm>
             <a:off x="457201" y="5097050"/>
-            <a:ext cx="8328990" cy="646331"/>
+            <a:ext cx="8328990" cy="584775"/>
           </a:xfrm>
           <a:prstGeom prst="rect">
             <a:avLst/>
@@ -8229,36 +8134,9 @@
           <a:lstStyle/>
           <a:p>
             <a:r>
-              <a:rPr lang="en-US" dirty="0" smtClean="0">
-                <a:latin typeface="NimbusRomNo9L-Regu"/>
-              </a:rPr>
-              <a:t>[6] I</a:t>
-            </a:r>
-            <a:r>
-              <a:rPr lang="en-US" dirty="0">
-                <a:latin typeface="NimbusRomNo9L-Regu"/>
-              </a:rPr>
-              <a:t>. H. Witten and E. Frank. 2005. Data mining: Practical machine </a:t>
-            </a:r>
-            <a:r>
-              <a:rPr lang="en-US" dirty="0" smtClean="0">
-                <a:latin typeface="NimbusRomNo9L-Regu"/>
-              </a:rPr>
-              <a:t>learning tools </a:t>
-            </a:r>
-            <a:r>
-              <a:rPr lang="en-US" dirty="0">
-                <a:latin typeface="NimbusRomNo9L-Regu"/>
-              </a:rPr>
-              <a:t>and techniques. (2005). http://</a:t>
-            </a:r>
-            <a:r>
-              <a:rPr lang="en-US" dirty="0" smtClean="0">
-                <a:latin typeface="NimbusRomNo9L-Regu"/>
-              </a:rPr>
-              <a:t>www.cs.waikato.ac.nz/ml/weka/index.html</a:t>
-            </a:r>
-            <a:endParaRPr lang="en-US" dirty="0"/>
+              <a:rPr lang="en-US" sz="1600" dirty="0"/>
+              <a:t>[6] I. H. Witten and E. Frank. 2005. Data mining: Practical machine learning tools and techniques. (2005). http://www.cs.waikato.ac.nz/ml/weka/index.html</a:t>
+            </a:r>
           </a:p>
         </p:txBody>
       </p:sp>
@@ -8271,7 +8149,7 @@
         <p:spPr>
           <a:xfrm>
             <a:off x="457201" y="5811660"/>
-            <a:ext cx="8328990" cy="646331"/>
+            <a:ext cx="8328990" cy="584775"/>
           </a:xfrm>
           <a:prstGeom prst="rect">
             <a:avLst/>
@@ -8284,30 +8162,9 @@
           <a:lstStyle/>
           <a:p>
             <a:r>
-              <a:rPr lang="en-US" dirty="0" smtClean="0">
-                <a:latin typeface="NimbusRomNo9L-Regu"/>
-              </a:rPr>
-              <a:t>[7] Y</a:t>
-            </a:r>
-            <a:r>
-              <a:rPr lang="en-US" dirty="0">
-                <a:latin typeface="NimbusRomNo9L-Regu"/>
-              </a:rPr>
-              <a:t>. Yang and J. O. Pederson. 1997. A comparative study on feature </a:t>
-            </a:r>
-            <a:r>
-              <a:rPr lang="en-US" dirty="0" smtClean="0">
-                <a:latin typeface="NimbusRomNo9L-Regu"/>
-              </a:rPr>
-              <a:t>selection in </a:t>
-            </a:r>
-            <a:r>
-              <a:rPr lang="en-US" dirty="0">
-                <a:latin typeface="NimbusRomNo9L-Regu"/>
-              </a:rPr>
-              <a:t>text categorization. (1997), 412–420.</a:t>
-            </a:r>
-            <a:endParaRPr lang="en-US" dirty="0"/>
+              <a:rPr lang="en-US" sz="1600" dirty="0"/>
+              <a:t>[7] Y. Yang and J. O. Pederson. 1997. A comparative study on feature selection in text categorization. (1997), 412–420.</a:t>
+            </a:r>
           </a:p>
         </p:txBody>
       </p:sp>
@@ -8666,12 +8523,143 @@
             <p:ph idx="1"/>
           </p:nvPr>
         </p:nvSpPr>
-        <p:spPr/>
-        <p:txBody>
-          <a:bodyPr/>
+        <p:spPr>
+          <a:xfrm>
+            <a:off x="457199" y="1600200"/>
+            <a:ext cx="8328991" cy="4876800"/>
+          </a:xfrm>
+        </p:spPr>
+        <p:txBody>
+          <a:bodyPr>
+            <a:normAutofit lnSpcReduction="10000"/>
+          </a:bodyPr>
           <a:lstStyle/>
           <a:p>
-            <a:endParaRPr lang="en-US"/>
+            <a:r>
+              <a:rPr lang="en-US" sz="2200" dirty="0"/>
+              <a:t>“Semantics-Aware Malware </a:t>
+            </a:r>
+            <a:r>
+              <a:rPr lang="en-US" sz="2200" dirty="0" smtClean="0"/>
+              <a:t>Detection” [3]</a:t>
+            </a:r>
+          </a:p>
+          <a:p>
+            <a:pPr lvl="1"/>
+            <a:r>
+              <a:rPr lang="en-US" sz="1800" dirty="0"/>
+              <a:t>Requires knowledge of malwares behaviors</a:t>
+            </a:r>
+          </a:p>
+          <a:p>
+            <a:pPr lvl="1"/>
+            <a:r>
+              <a:rPr lang="en-US" sz="1800" dirty="0"/>
+              <a:t>Pre-defined templates of sequence of instructions</a:t>
+            </a:r>
+          </a:p>
+          <a:p>
+            <a:pPr lvl="1"/>
+            <a:r>
+              <a:rPr lang="en-US" sz="1800" dirty="0"/>
+              <a:t>Resilient to obfuscation, but only works with a limited set of transformations used by </a:t>
+            </a:r>
+            <a:r>
+              <a:rPr lang="en-US" sz="1800" dirty="0" smtClean="0"/>
+              <a:t>hackers</a:t>
+            </a:r>
+          </a:p>
+          <a:p>
+            <a:pPr lvl="1"/>
+            <a:endParaRPr lang="en-US" sz="1800" dirty="0" smtClean="0"/>
+          </a:p>
+          <a:p>
+            <a:r>
+              <a:rPr lang="en-US" sz="2200" dirty="0" smtClean="0"/>
+              <a:t>“</a:t>
+            </a:r>
+            <a:r>
+              <a:rPr lang="en-US" sz="2200" dirty="0"/>
+              <a:t>Proposal </a:t>
+            </a:r>
+            <a:r>
+              <a:rPr lang="en-US" sz="2200" dirty="0" smtClean="0"/>
+              <a:t>of N-gram </a:t>
+            </a:r>
+            <a:r>
+              <a:rPr lang="en-US" sz="2200" dirty="0"/>
+              <a:t>Based Algorithm for Malware </a:t>
+            </a:r>
+            <a:r>
+              <a:rPr lang="en-US" sz="2200" dirty="0" smtClean="0"/>
+              <a:t>Classification” [1]</a:t>
+            </a:r>
+          </a:p>
+          <a:p>
+            <a:pPr lvl="1"/>
+            <a:r>
+              <a:rPr lang="en-US" sz="1800" dirty="0" smtClean="0"/>
+              <a:t>Centroid formed using most frequent N-grams</a:t>
+            </a:r>
+          </a:p>
+          <a:p>
+            <a:pPr lvl="1"/>
+            <a:r>
+              <a:rPr lang="en-US" sz="1800" dirty="0" smtClean="0"/>
+              <a:t>Most frequent N-grams can be irrelevant to the malware family</a:t>
+            </a:r>
+          </a:p>
+          <a:p>
+            <a:pPr lvl="1"/>
+            <a:endParaRPr lang="en-US" sz="1800" dirty="0" smtClean="0"/>
+          </a:p>
+          <a:p>
+            <a:r>
+              <a:rPr lang="en-US" sz="2200" dirty="0" smtClean="0"/>
+              <a:t>“</a:t>
+            </a:r>
+            <a:r>
+              <a:rPr lang="en-US" sz="2200" dirty="0"/>
+              <a:t>Learning to Detect and Classify </a:t>
+            </a:r>
+            <a:r>
+              <a:rPr lang="en-US" sz="2200" dirty="0" smtClean="0"/>
+              <a:t>Malicious Executables </a:t>
+            </a:r>
+            <a:r>
+              <a:rPr lang="en-US" sz="2200" dirty="0"/>
+              <a:t>in </a:t>
+            </a:r>
+            <a:r>
+              <a:rPr lang="en-US" sz="2200" dirty="0" smtClean="0"/>
+              <a:t>the Wild” [2]</a:t>
+            </a:r>
+          </a:p>
+          <a:p>
+            <a:pPr lvl="1"/>
+            <a:r>
+              <a:rPr lang="en-US" sz="1800" dirty="0" smtClean="0"/>
+              <a:t>Selecting N-grams based on information gain</a:t>
+            </a:r>
+          </a:p>
+          <a:p>
+            <a:pPr lvl="1"/>
+            <a:r>
+              <a:rPr lang="en-US" sz="1800" dirty="0" smtClean="0"/>
+              <a:t>Several classifiers applied: </a:t>
+            </a:r>
+            <a:r>
+              <a:rPr lang="en-US" sz="1800" dirty="0" err="1" smtClean="0"/>
+              <a:t>IBk</a:t>
+            </a:r>
+            <a:r>
+              <a:rPr lang="en-US" sz="1800" dirty="0" smtClean="0"/>
+              <a:t>, Naïve Bayes, SVM, Decision Tree (J48)</a:t>
+            </a:r>
+          </a:p>
+          <a:p>
+            <a:pPr lvl="1"/>
+            <a:endParaRPr lang="en-US" sz="1800" dirty="0" smtClean="0"/>
           </a:p>
         </p:txBody>
       </p:sp>

</xml_diff>